<commit_message>
Synopsis added and PPT Refinalized
</commit_message>
<xml_diff>
--- a/Phase PPT/Durgesh Nandan/0th Phase/SakshamPPT.pptx
+++ b/Phase PPT/Durgesh Nandan/0th Phase/SakshamPPT.pptx
@@ -18267,7 +18267,7 @@
                 <a:ea typeface="Arial" panose="020B0604020202020204" pitchFamily="34" charset="0"/>
                 <a:cs typeface="Arial" panose="020B0604020202020204" pitchFamily="34" charset="0"/>
               </a:rPr>
-              <a:t>Hand-to-Hand Instant Message Communication: Revisiting Morse Code by Sujay Pawar. https://www.academia.edu/26952487/Hand-to-Hand_Instant_Message_Communication_Revisiting_Morse_Code</a:t>
+              <a:t>Hand-to-Hand Instant Message Communication: Revisiting Morse Code by Sujay Pawar. https://www.academia.edu/26952487/Hand-to-Hand_Instant_Message_Communication_Revisiting_Morse_Code.</a:t>
             </a:r>
             <a:endParaRPr lang="en-US" altLang="zh-CN" sz="2000" dirty="0">
               <a:solidFill>
@@ -18295,7 +18295,7 @@
                 <a:ea typeface="Arial" panose="020B0604020202020204" pitchFamily="34" charset="0"/>
                 <a:cs typeface="Arial" panose="020B0604020202020204" pitchFamily="34" charset="0"/>
               </a:rPr>
-              <a:t>Sulmon, N., Slegers, K., Van Isacker, K., Gemou, M., Bekiaris, E.: Using Personasto capture Assistive Technology Needs of People with Disabilities. Status Publ.(2010)</a:t>
+              <a:t>Disability and assisstive technology: Omer Faruk Islim,Kursat Cagiltay, Middle East Technical University, Turkey.</a:t>
             </a:r>
             <a:endParaRPr lang="en-US" altLang="zh-CN" sz="2000" dirty="0">
               <a:solidFill>
@@ -18323,7 +18323,7 @@
                 <a:ea typeface="Arial" panose="020B0604020202020204" pitchFamily="34" charset="0"/>
                 <a:cs typeface="Arial" panose="020B0604020202020204" pitchFamily="34" charset="0"/>
               </a:rPr>
-              <a:t>Thimbleby, H.: Understanding User Centred Design (UCD) for People with SpecialNeeds, 1611–3349 (2008)26. Henry, S.: Just ask: integrating accessibility throughout design. [United States?]:Lulu.com (2007)</a:t>
+              <a:t>Thimbleby, H.: Understanding User Centred Design (UCD) for People with SpecialNeeds, 1611–3349 (2008)26. Henry, S.: Just ask: integrating accessibility throughout design. [United States]:Lulu.com (2007).</a:t>
             </a:r>
             <a:endParaRPr lang="en-US" altLang="zh-CN" sz="2000" dirty="0">
               <a:solidFill>

</xml_diff>